<commit_message>
add vmem l1 optimization
</commit_message>
<xml_diff>
--- a/vmemSQIssue/vmem_sq_issue.pptx
+++ b/vmemSQIssue/vmem_sq_issue.pptx
@@ -2080,6 +2080,22 @@
             </a:r>
           </a:p>
           <a:p>
+            <a:pPr lvl="1"/>
+            <a:r>
+              <a:rPr lang="en-US" dirty="0"/>
+              <a:t>TA req takes 4 address token, </a:t>
+            </a:r>
+          </a:p>
+          <a:p>
+            <a:pPr marL="367665" lvl="1" indent="0">
+              <a:buNone/>
+            </a:pPr>
+            <a:r>
+              <a:rPr lang="en-US" dirty="0"/>
+              <a:t>   one token takes 4 continues address data(dword)</a:t>
+            </a:r>
+          </a:p>
+          <a:p>
             <a:pPr fontAlgn="auto"/>
             <a:r>
               <a:rPr lang="en-US" dirty="0" err="1"/>
@@ -2094,22 +2110,14 @@
             <a:pPr lvl="1"/>
             <a:r>
               <a:rPr lang="en-US" dirty="0"/>
-              <a:t>4 </a:t>
-            </a:r>
-            <a:r>
-              <a:rPr lang="en-US" dirty="0" err="1"/>
-              <a:t>clk</a:t>
-            </a:r>
-            <a:r>
-              <a:rPr lang="en-US" dirty="0"/>
-              <a:t> per issue per wave</a:t>
+              <a:t>cacheline usage  100%: not block</a:t>
             </a:r>
           </a:p>
           <a:p>
             <a:pPr lvl="1"/>
             <a:r>
               <a:rPr lang="en-US" dirty="0"/>
-              <a:t>will not block</a:t>
+              <a:t>cacheline usage&lt;100%: first 12 issue not block</a:t>
             </a:r>
           </a:p>
           <a:p>
@@ -2117,21 +2125,6 @@
             <a:r>
               <a:rPr lang="en-US" dirty="0"/>
               <a:t>flat_load_dwordx4</a:t>
-            </a:r>
-          </a:p>
-          <a:p>
-            <a:pPr lvl="1"/>
-            <a:r>
-              <a:rPr lang="en-US" dirty="0"/>
-              <a:t>16 </a:t>
-            </a:r>
-            <a:r>
-              <a:rPr lang="en-US" dirty="0" err="1"/>
-              <a:t>clk</a:t>
-            </a:r>
-            <a:r>
-              <a:rPr lang="en-US" dirty="0"/>
-              <a:t> per issue per wave</a:t>
             </a:r>
           </a:p>
           <a:p>
@@ -2178,7 +2171,7 @@
         </p:blipFill>
         <p:spPr>
           <a:xfrm>
-            <a:off x="7381314" y="1225312"/>
+            <a:off x="7606397" y="1087366"/>
             <a:ext cx="3784795" cy="1422473"/>
           </a:xfrm>
           <a:prstGeom prst="rect">
@@ -2214,8 +2207,43 @@
         </p:blipFill>
         <p:spPr>
           <a:xfrm>
-            <a:off x="7381314" y="3178381"/>
+            <a:off x="7621049" y="4181976"/>
             <a:ext cx="3016405" cy="1485976"/>
+          </a:xfrm>
+          <a:prstGeom prst="rect">
+            <a:avLst/>
+          </a:prstGeom>
+        </p:spPr>
+      </p:pic>
+      <p:pic>
+        <p:nvPicPr>
+          <p:cNvPr id="7" name="Picture 6" descr="A picture containing device, train&#10;&#10;Description automatically generated">
+            <a:extLst>
+              <a:ext uri="{FF2B5EF4-FFF2-40B4-BE49-F238E27FC236}">
+                <a16:creationId xmlns:a16="http://schemas.microsoft.com/office/drawing/2014/main" id="{0AF2894A-7407-4DAB-A26F-C648571C68F5}"/>
+              </a:ext>
+            </a:extLst>
+          </p:cNvPr>
+          <p:cNvPicPr>
+            <a:picLocks noChangeAspect="1"/>
+          </p:cNvPicPr>
+          <p:nvPr/>
+        </p:nvPicPr>
+        <p:blipFill rotWithShape="1">
+          <a:blip r:embed="rId4">
+            <a:extLst>
+              <a:ext uri="{28A0092B-C50C-407E-A947-70E740481C1C}">
+                <a14:useLocalDpi xmlns:a14="http://schemas.microsoft.com/office/drawing/2010/main" val="0"/>
+              </a:ext>
+            </a:extLst>
+          </a:blip>
+          <a:srcRect l="10804" t="41268" r="38610" b="-11097"/>
+          <a:stretch/>
+        </p:blipFill>
+        <p:spPr>
+          <a:xfrm>
+            <a:off x="7621049" y="2635435"/>
+            <a:ext cx="4792859" cy="1698365"/>
           </a:xfrm>
           <a:prstGeom prst="rect">
             <a:avLst/>
@@ -3180,6 +3208,15 @@
 </file>
 
 <file path=customXml/item1.xml><?xml version="1.0" encoding="utf-8"?>
+<?mso-contentType ?>
+<FormTemplates xmlns="http://schemas.microsoft.com/sharepoint/v3/contenttype/forms">
+  <Display>DocumentLibraryForm</Display>
+  <Edit>DocumentLibraryForm</Edit>
+  <New>DocumentLibraryForm</New>
+</FormTemplates>
+</file>
+
+<file path=customXml/item2.xml><?xml version="1.0" encoding="utf-8"?>
 <ct:contentTypeSchema xmlns:ct="http://schemas.microsoft.com/office/2006/metadata/contentType" xmlns:ma="http://schemas.microsoft.com/office/2006/metadata/properties/metaAttributes" ct:_="" ma:_="" ma:contentTypeName="Document" ma:contentTypeID="0x010100B040F28C9190714F9051F1661A72B344" ma:contentTypeVersion="0" ma:contentTypeDescription="Create a new document." ma:contentTypeScope="" ma:versionID="b8b95d69f10381dae1e3fc8aa097d9b2">
   <xsd:schema xmlns:xsd="http://www.w3.org/2001/XMLSchema" xmlns:xs="http://www.w3.org/2001/XMLSchema" xmlns:p="http://schemas.microsoft.com/office/2006/metadata/properties" targetNamespace="http://schemas.microsoft.com/office/2006/metadata/properties" ma:root="true" ma:fieldsID="1b05d82d297216baf5b26c55225140df">
     <xsd:element name="properties">
@@ -3293,16 +3330,15 @@
 </ct:contentTypeSchema>
 </file>
 
-<file path=customXml/item2.xml><?xml version="1.0" encoding="utf-8"?>
-<?mso-contentType ?>
-<FormTemplates xmlns="http://schemas.microsoft.com/sharepoint/v3/contenttype/forms">
-  <Display>DocumentLibraryForm</Display>
-  <Edit>DocumentLibraryForm</Edit>
-  <New>DocumentLibraryForm</New>
-</FormTemplates>
+<file path=customXml/itemProps1.xml><?xml version="1.0" encoding="utf-8"?>
+<ds:datastoreItem xmlns:ds="http://schemas.openxmlformats.org/officeDocument/2006/customXml" ds:itemID="{46C7C7BA-398C-443C-9325-A8C61CE3C0A0}">
+  <ds:schemaRefs>
+    <ds:schemaRef ds:uri="http://schemas.microsoft.com/sharepoint/v3/contenttype/forms"/>
+  </ds:schemaRefs>
+</ds:datastoreItem>
 </file>
 
-<file path=customXml/itemProps1.xml><?xml version="1.0" encoding="utf-8"?>
+<file path=customXml/itemProps2.xml><?xml version="1.0" encoding="utf-8"?>
 <ds:datastoreItem xmlns:ds="http://schemas.openxmlformats.org/officeDocument/2006/customXml" ds:itemID="{CB9B9DAE-0203-490A-8CF8-6A331C5A0B02}">
   <ds:schemaRefs>
     <ds:schemaRef ds:uri="http://schemas.microsoft.com/office/2006/metadata/contentType"/>
@@ -3316,12 +3352,4 @@
     <ds:schemaRef ds:uri="http://schemas.microsoft.com/office/infopath/2007/PartnerControls"/>
   </ds:schemaRefs>
 </ds:datastoreItem>
-</file>
-
-<file path=customXml/itemProps2.xml><?xml version="1.0" encoding="utf-8"?>
-<ds:datastoreItem xmlns:ds="http://schemas.openxmlformats.org/officeDocument/2006/customXml" ds:itemID="{46C7C7BA-398C-443C-9325-A8C61CE3C0A0}">
-  <ds:schemaRefs>
-    <ds:schemaRef ds:uri="http://schemas.microsoft.com/sharepoint/v3/contenttype/forms"/>
-  </ds:schemaRefs>
-</ds:datastoreItem>
 </file>
</xml_diff>